<commit_message>
commit	new file:   mobile platforms virtual memory.pdf commit	modified:   presentation paper.pptx
</commit_message>
<xml_diff>
--- a/presentation paper.pptx
+++ b/presentation paper.pptx
@@ -5,7 +5,7 @@
     <p:sldMasterId id="2147483648" r:id="rId1"/>
   </p:sldMasterIdLst>
   <p:notesMasterIdLst>
-    <p:notesMasterId r:id="rId9"/>
+    <p:notesMasterId r:id="rId11"/>
   </p:notesMasterIdLst>
   <p:sldIdLst>
     <p:sldId id="256" r:id="rId2"/>
@@ -15,6 +15,8 @@
     <p:sldId id="260" r:id="rId6"/>
     <p:sldId id="261" r:id="rId7"/>
     <p:sldId id="262" r:id="rId8"/>
+    <p:sldId id="263" r:id="rId9"/>
+    <p:sldId id="264" r:id="rId10"/>
   </p:sldIdLst>
   <p:sldSz cx="12192000" cy="6858000"/>
   <p:notesSz cx="6858000" cy="9144000"/>
@@ -207,7 +209,7 @@
           <a:p>
             <a:fld id="{C4F57B92-571A-4F3D-A442-5CF1A6841E48}" type="datetimeFigureOut">
               <a:rPr lang="en-US" smtClean="0"/>
-              <a:t>9/21/2017</a:t>
+              <a:t>9/22/2017</a:t>
             </a:fld>
             <a:endParaRPr lang="en-US"/>
           </a:p>
@@ -957,7 +959,7 @@
           <a:p>
             <a:fld id="{BE594A49-0664-4F98-B6CE-606FC87ECC01}" type="datetimeFigureOut">
               <a:rPr lang="en-US" smtClean="0"/>
-              <a:t>9/21/2017</a:t>
+              <a:t>9/22/2017</a:t>
             </a:fld>
             <a:endParaRPr lang="en-US"/>
           </a:p>
@@ -1155,7 +1157,7 @@
           <a:p>
             <a:fld id="{BE594A49-0664-4F98-B6CE-606FC87ECC01}" type="datetimeFigureOut">
               <a:rPr lang="en-US" smtClean="0"/>
-              <a:t>9/21/2017</a:t>
+              <a:t>9/22/2017</a:t>
             </a:fld>
             <a:endParaRPr lang="en-US"/>
           </a:p>
@@ -1363,7 +1365,7 @@
           <a:p>
             <a:fld id="{BE594A49-0664-4F98-B6CE-606FC87ECC01}" type="datetimeFigureOut">
               <a:rPr lang="en-US" smtClean="0"/>
-              <a:t>9/21/2017</a:t>
+              <a:t>9/22/2017</a:t>
             </a:fld>
             <a:endParaRPr lang="en-US"/>
           </a:p>
@@ -1561,7 +1563,7 @@
           <a:p>
             <a:fld id="{BE594A49-0664-4F98-B6CE-606FC87ECC01}" type="datetimeFigureOut">
               <a:rPr lang="en-US" smtClean="0"/>
-              <a:t>9/21/2017</a:t>
+              <a:t>9/22/2017</a:t>
             </a:fld>
             <a:endParaRPr lang="en-US"/>
           </a:p>
@@ -1836,7 +1838,7 @@
           <a:p>
             <a:fld id="{BE594A49-0664-4F98-B6CE-606FC87ECC01}" type="datetimeFigureOut">
               <a:rPr lang="en-US" smtClean="0"/>
-              <a:t>9/21/2017</a:t>
+              <a:t>9/22/2017</a:t>
             </a:fld>
             <a:endParaRPr lang="en-US"/>
           </a:p>
@@ -2101,7 +2103,7 @@
           <a:p>
             <a:fld id="{BE594A49-0664-4F98-B6CE-606FC87ECC01}" type="datetimeFigureOut">
               <a:rPr lang="en-US" smtClean="0"/>
-              <a:t>9/21/2017</a:t>
+              <a:t>9/22/2017</a:t>
             </a:fld>
             <a:endParaRPr lang="en-US"/>
           </a:p>
@@ -2513,7 +2515,7 @@
           <a:p>
             <a:fld id="{BE594A49-0664-4F98-B6CE-606FC87ECC01}" type="datetimeFigureOut">
               <a:rPr lang="en-US" smtClean="0"/>
-              <a:t>9/21/2017</a:t>
+              <a:t>9/22/2017</a:t>
             </a:fld>
             <a:endParaRPr lang="en-US"/>
           </a:p>
@@ -2654,7 +2656,7 @@
           <a:p>
             <a:fld id="{BE594A49-0664-4F98-B6CE-606FC87ECC01}" type="datetimeFigureOut">
               <a:rPr lang="en-US" smtClean="0"/>
-              <a:t>9/21/2017</a:t>
+              <a:t>9/22/2017</a:t>
             </a:fld>
             <a:endParaRPr lang="en-US"/>
           </a:p>
@@ -2767,7 +2769,7 @@
           <a:p>
             <a:fld id="{BE594A49-0664-4F98-B6CE-606FC87ECC01}" type="datetimeFigureOut">
               <a:rPr lang="en-US" smtClean="0"/>
-              <a:t>9/21/2017</a:t>
+              <a:t>9/22/2017</a:t>
             </a:fld>
             <a:endParaRPr lang="en-US"/>
           </a:p>
@@ -3078,7 +3080,7 @@
           <a:p>
             <a:fld id="{BE594A49-0664-4F98-B6CE-606FC87ECC01}" type="datetimeFigureOut">
               <a:rPr lang="en-US" smtClean="0"/>
-              <a:t>9/21/2017</a:t>
+              <a:t>9/22/2017</a:t>
             </a:fld>
             <a:endParaRPr lang="en-US"/>
           </a:p>
@@ -3366,7 +3368,7 @@
           <a:p>
             <a:fld id="{BE594A49-0664-4F98-B6CE-606FC87ECC01}" type="datetimeFigureOut">
               <a:rPr lang="en-US" smtClean="0"/>
-              <a:t>9/21/2017</a:t>
+              <a:t>9/22/2017</a:t>
             </a:fld>
             <a:endParaRPr lang="en-US"/>
           </a:p>
@@ -3607,7 +3609,7 @@
           <a:p>
             <a:fld id="{BE594A49-0664-4F98-B6CE-606FC87ECC01}" type="datetimeFigureOut">
               <a:rPr lang="en-US" smtClean="0"/>
-              <a:t>9/21/2017</a:t>
+              <a:t>9/22/2017</a:t>
             </a:fld>
             <a:endParaRPr lang="en-US"/>
           </a:p>
@@ -4850,10 +4852,18 @@
         </p:nvSpPr>
         <p:spPr/>
         <p:txBody>
-          <a:bodyPr/>
-          <a:lstStyle/>
-          <a:p>
-            <a:endParaRPr lang="en-US"/>
+          <a:bodyPr>
+            <a:normAutofit/>
+          </a:bodyPr>
+          <a:lstStyle/>
+          <a:p>
+            <a:r>
+              <a:rPr lang="en-US" sz="3200" b="1" dirty="0">
+                <a:latin typeface="Times New Roman" panose="02020603050405020304" pitchFamily="18" charset="0"/>
+                <a:cs typeface="Times New Roman" panose="02020603050405020304" pitchFamily="18" charset="0"/>
+              </a:rPr>
+              <a:t>Design a VNODE:</a:t>
+            </a:r>
           </a:p>
         </p:txBody>
       </p:sp>
@@ -4873,7 +4883,12 @@
             <p:ph idx="1"/>
           </p:nvPr>
         </p:nvSpPr>
-        <p:spPr/>
+        <p:spPr>
+          <a:xfrm>
+            <a:off x="838200" y="1825625"/>
+            <a:ext cx="10515600" cy="4351338"/>
+          </a:xfrm>
+        </p:spPr>
         <p:txBody>
           <a:bodyPr>
             <a:normAutofit/>
@@ -4977,6 +4992,345 @@
     <p:extLst>
       <p:ext uri="{BB962C8B-B14F-4D97-AF65-F5344CB8AC3E}">
         <p14:creationId xmlns:p14="http://schemas.microsoft.com/office/powerpoint/2010/main" val="3033104427"/>
+      </p:ext>
+    </p:extLst>
+  </p:cSld>
+  <p:clrMapOvr>
+    <a:masterClrMapping/>
+  </p:clrMapOvr>
+</p:sld>
+</file>
+
+<file path=ppt/slides/slide8.xml><?xml version="1.0" encoding="utf-8"?>
+<p:sld xmlns:a="http://schemas.openxmlformats.org/drawingml/2006/main" xmlns:r="http://schemas.openxmlformats.org/officeDocument/2006/relationships" xmlns:p="http://schemas.openxmlformats.org/presentationml/2006/main">
+  <p:cSld>
+    <p:spTree>
+      <p:nvGrpSpPr>
+        <p:cNvPr id="1" name=""/>
+        <p:cNvGrpSpPr/>
+        <p:nvPr/>
+      </p:nvGrpSpPr>
+      <p:grpSpPr>
+        <a:xfrm>
+          <a:off x="0" y="0"/>
+          <a:ext cx="0" cy="0"/>
+          <a:chOff x="0" y="0"/>
+          <a:chExt cx="0" cy="0"/>
+        </a:xfrm>
+      </p:grpSpPr>
+      <p:sp>
+        <p:nvSpPr>
+          <p:cNvPr id="3" name="Content Placeholder 2">
+            <a:extLst>
+              <a:ext uri="{FF2B5EF4-FFF2-40B4-BE49-F238E27FC236}">
+                <a16:creationId xmlns:a16="http://schemas.microsoft.com/office/drawing/2014/main" id="{CD6B70D1-5474-46B4-9A53-FA5E2332E39F}"/>
+              </a:ext>
+            </a:extLst>
+          </p:cNvPr>
+          <p:cNvSpPr>
+            <a:spLocks noGrp="1"/>
+          </p:cNvSpPr>
+          <p:nvPr>
+            <p:ph idx="1"/>
+          </p:nvPr>
+        </p:nvSpPr>
+        <p:spPr>
+          <a:xfrm>
+            <a:off x="838200" y="254977"/>
+            <a:ext cx="10515600" cy="5921986"/>
+          </a:xfrm>
+        </p:spPr>
+        <p:txBody>
+          <a:bodyPr/>
+          <a:lstStyle/>
+          <a:p>
+            <a:pPr marL="0" indent="0">
+              <a:buNone/>
+            </a:pPr>
+            <a:r>
+              <a:rPr lang="en-US" b="1" dirty="0" err="1">
+                <a:latin typeface="Times New Roman" panose="02020603050405020304" pitchFamily="18" charset="0"/>
+                <a:cs typeface="Times New Roman" panose="02020603050405020304" pitchFamily="18" charset="0"/>
+              </a:rPr>
+              <a:t>allocate_page_vma</a:t>
+            </a:r>
+            <a:r>
+              <a:rPr lang="en-US" b="1" dirty="0">
+                <a:latin typeface="Times New Roman" panose="02020603050405020304" pitchFamily="18" charset="0"/>
+                <a:cs typeface="Times New Roman" panose="02020603050405020304" pitchFamily="18" charset="0"/>
+              </a:rPr>
+              <a:t>: </a:t>
+            </a:r>
+            <a:r>
+              <a:rPr lang="en-US" dirty="0">
+                <a:latin typeface="Times New Roman" panose="02020603050405020304" pitchFamily="18" charset="0"/>
+                <a:cs typeface="Times New Roman" panose="02020603050405020304" pitchFamily="18" charset="0"/>
+              </a:rPr>
+              <a:t>manages the pages of the applications in the virtual memory space</a:t>
+            </a:r>
+            <a:r>
+              <a:rPr lang="en-US" dirty="0"/>
+              <a:t>.</a:t>
+            </a:r>
+          </a:p>
+          <a:p>
+            <a:pPr marL="0" indent="0">
+              <a:buNone/>
+            </a:pPr>
+            <a:r>
+              <a:rPr lang="en-US" b="1" dirty="0" err="1">
+                <a:latin typeface="Times New Roman" panose="02020603050405020304" pitchFamily="18" charset="0"/>
+                <a:cs typeface="Times New Roman" panose="02020603050405020304" pitchFamily="18" charset="0"/>
+              </a:rPr>
+              <a:t>allocate_page_interleave</a:t>
+            </a:r>
+            <a:r>
+              <a:rPr lang="en-US" b="1" dirty="0">
+                <a:latin typeface="Times New Roman" panose="02020603050405020304" pitchFamily="18" charset="0"/>
+                <a:cs typeface="Times New Roman" panose="02020603050405020304" pitchFamily="18" charset="0"/>
+              </a:rPr>
+              <a:t>: </a:t>
+            </a:r>
+            <a:r>
+              <a:rPr lang="en-US" dirty="0">
+                <a:latin typeface="Times New Roman" panose="02020603050405020304" pitchFamily="18" charset="0"/>
+                <a:cs typeface="Times New Roman" panose="02020603050405020304" pitchFamily="18" charset="0"/>
+              </a:rPr>
+              <a:t>executes the low level operation to interconnect an application and a memory area.</a:t>
+            </a:r>
+          </a:p>
+          <a:p>
+            <a:pPr marL="0" indent="0">
+              <a:buNone/>
+            </a:pPr>
+            <a:r>
+              <a:rPr lang="en-US" b="1" dirty="0" err="1">
+                <a:latin typeface="Times New Roman" panose="02020603050405020304" pitchFamily="18" charset="0"/>
+                <a:cs typeface="Times New Roman" panose="02020603050405020304" pitchFamily="18" charset="0"/>
+              </a:rPr>
+              <a:t>allocate_page_current</a:t>
+            </a:r>
+            <a:r>
+              <a:rPr lang="en-US" b="1" dirty="0">
+                <a:latin typeface="Times New Roman" panose="02020603050405020304" pitchFamily="18" charset="0"/>
+                <a:cs typeface="Times New Roman" panose="02020603050405020304" pitchFamily="18" charset="0"/>
+              </a:rPr>
+              <a:t>: </a:t>
+            </a:r>
+            <a:r>
+              <a:rPr lang="en-US" dirty="0">
+                <a:latin typeface="Times New Roman" panose="02020603050405020304" pitchFamily="18" charset="0"/>
+                <a:cs typeface="Times New Roman" panose="02020603050405020304" pitchFamily="18" charset="0"/>
+              </a:rPr>
+              <a:t>allocate the current page in process</a:t>
+            </a:r>
+          </a:p>
+          <a:p>
+            <a:pPr marL="0" indent="0">
+              <a:buNone/>
+            </a:pPr>
+            <a:r>
+              <a:rPr lang="en-US" b="1" dirty="0" err="1">
+                <a:latin typeface="Times New Roman" panose="02020603050405020304" pitchFamily="18" charset="0"/>
+                <a:cs typeface="Times New Roman" panose="02020603050405020304" pitchFamily="18" charset="0"/>
+              </a:rPr>
+              <a:t>allocate_page</a:t>
+            </a:r>
+            <a:r>
+              <a:rPr lang="en-US" b="1" dirty="0">
+                <a:latin typeface="Times New Roman" panose="02020603050405020304" pitchFamily="18" charset="0"/>
+                <a:cs typeface="Times New Roman" panose="02020603050405020304" pitchFamily="18" charset="0"/>
+              </a:rPr>
+              <a:t>: </a:t>
+            </a:r>
+            <a:r>
+              <a:rPr lang="en-US" dirty="0">
+                <a:latin typeface="Times New Roman" panose="02020603050405020304" pitchFamily="18" charset="0"/>
+                <a:cs typeface="Times New Roman" panose="02020603050405020304" pitchFamily="18" charset="0"/>
+              </a:rPr>
+              <a:t>If the operating system needs to find the allocated</a:t>
+            </a:r>
+          </a:p>
+          <a:p>
+            <a:pPr marL="0" indent="0">
+              <a:buNone/>
+            </a:pPr>
+            <a:r>
+              <a:rPr lang="en-US" dirty="0">
+                <a:latin typeface="Times New Roman" panose="02020603050405020304" pitchFamily="18" charset="0"/>
+                <a:cs typeface="Times New Roman" panose="02020603050405020304" pitchFamily="18" charset="0"/>
+              </a:rPr>
+              <a:t>memory address currently according to the process request, the </a:t>
+            </a:r>
+            <a:r>
+              <a:rPr lang="en-US" dirty="0" err="1">
+                <a:latin typeface="Times New Roman" panose="02020603050405020304" pitchFamily="18" charset="0"/>
+                <a:cs typeface="Times New Roman" panose="02020603050405020304" pitchFamily="18" charset="0"/>
+              </a:rPr>
+              <a:t>allocate_page</a:t>
+            </a:r>
+            <a:r>
+              <a:rPr lang="en-US" dirty="0">
+                <a:latin typeface="Times New Roman" panose="02020603050405020304" pitchFamily="18" charset="0"/>
+                <a:cs typeface="Times New Roman" panose="02020603050405020304" pitchFamily="18" charset="0"/>
+              </a:rPr>
+              <a:t> function calls the </a:t>
+            </a:r>
+            <a:r>
+              <a:rPr lang="en-US" dirty="0" err="1">
+                <a:latin typeface="Times New Roman" panose="02020603050405020304" pitchFamily="18" charset="0"/>
+                <a:cs typeface="Times New Roman" panose="02020603050405020304" pitchFamily="18" charset="0"/>
+              </a:rPr>
+              <a:t>allocate_page_interleave</a:t>
+            </a:r>
+            <a:r>
+              <a:rPr lang="en-US" dirty="0">
+                <a:latin typeface="Times New Roman" panose="02020603050405020304" pitchFamily="18" charset="0"/>
+                <a:cs typeface="Times New Roman" panose="02020603050405020304" pitchFamily="18" charset="0"/>
+              </a:rPr>
+              <a:t> function via the </a:t>
+            </a:r>
+            <a:r>
+              <a:rPr lang="en-US" dirty="0" err="1">
+                <a:latin typeface="Times New Roman" panose="02020603050405020304" pitchFamily="18" charset="0"/>
+                <a:cs typeface="Times New Roman" panose="02020603050405020304" pitchFamily="18" charset="0"/>
+              </a:rPr>
+              <a:t>allocate_page_current</a:t>
+            </a:r>
+            <a:r>
+              <a:rPr lang="en-US" dirty="0">
+                <a:latin typeface="Times New Roman" panose="02020603050405020304" pitchFamily="18" charset="0"/>
+                <a:cs typeface="Times New Roman" panose="02020603050405020304" pitchFamily="18" charset="0"/>
+              </a:rPr>
+              <a:t> function.</a:t>
+            </a:r>
+          </a:p>
+          <a:p>
+            <a:pPr marL="0" indent="0">
+              <a:buNone/>
+            </a:pPr>
+            <a:r>
+              <a:rPr lang="en-US" b="1" dirty="0">
+                <a:latin typeface="Times New Roman" panose="02020603050405020304" pitchFamily="18" charset="0"/>
+                <a:cs typeface="Times New Roman" panose="02020603050405020304" pitchFamily="18" charset="0"/>
+              </a:rPr>
+              <a:t>__</a:t>
+            </a:r>
+            <a:r>
+              <a:rPr lang="en-US" b="1" dirty="0" err="1">
+                <a:latin typeface="Times New Roman" panose="02020603050405020304" pitchFamily="18" charset="0"/>
+                <a:cs typeface="Times New Roman" panose="02020603050405020304" pitchFamily="18" charset="0"/>
+              </a:rPr>
+              <a:t>allocate_pages</a:t>
+            </a:r>
+            <a:r>
+              <a:rPr lang="en-US" b="1" dirty="0">
+                <a:latin typeface="Times New Roman" panose="02020603050405020304" pitchFamily="18" charset="0"/>
+                <a:cs typeface="Times New Roman" panose="02020603050405020304" pitchFamily="18" charset="0"/>
+              </a:rPr>
+              <a:t>: </a:t>
+            </a:r>
+            <a:r>
+              <a:rPr lang="en-US" dirty="0"/>
+              <a:t>allocates/releases the memory area of the process using the processing result of VNODE’s three components</a:t>
+            </a:r>
+            <a:endParaRPr lang="en-US" dirty="0">
+              <a:latin typeface="Times New Roman" panose="02020603050405020304" pitchFamily="18" charset="0"/>
+              <a:cs typeface="Times New Roman" panose="02020603050405020304" pitchFamily="18" charset="0"/>
+            </a:endParaRPr>
+          </a:p>
+          <a:p>
+            <a:pPr marL="0" indent="0">
+              <a:buNone/>
+            </a:pPr>
+            <a:endParaRPr lang="en-US" dirty="0"/>
+          </a:p>
+        </p:txBody>
+      </p:sp>
+    </p:spTree>
+    <p:extLst>
+      <p:ext uri="{BB962C8B-B14F-4D97-AF65-F5344CB8AC3E}">
+        <p14:creationId xmlns:p14="http://schemas.microsoft.com/office/powerpoint/2010/main" val="1401843918"/>
+      </p:ext>
+    </p:extLst>
+  </p:cSld>
+  <p:clrMapOvr>
+    <a:masterClrMapping/>
+  </p:clrMapOvr>
+</p:sld>
+</file>
+
+<file path=ppt/slides/slide9.xml><?xml version="1.0" encoding="utf-8"?>
+<p:sld xmlns:a="http://schemas.openxmlformats.org/drawingml/2006/main" xmlns:r="http://schemas.openxmlformats.org/officeDocument/2006/relationships" xmlns:p="http://schemas.openxmlformats.org/presentationml/2006/main">
+  <p:cSld>
+    <p:spTree>
+      <p:nvGrpSpPr>
+        <p:cNvPr id="1" name=""/>
+        <p:cNvGrpSpPr/>
+        <p:nvPr/>
+      </p:nvGrpSpPr>
+      <p:grpSpPr>
+        <a:xfrm>
+          <a:off x="0" y="0"/>
+          <a:ext cx="0" cy="0"/>
+          <a:chOff x="0" y="0"/>
+          <a:chExt cx="0" cy="0"/>
+        </a:xfrm>
+      </p:grpSpPr>
+      <p:sp>
+        <p:nvSpPr>
+          <p:cNvPr id="2" name="Title 1">
+            <a:extLst>
+              <a:ext uri="{FF2B5EF4-FFF2-40B4-BE49-F238E27FC236}">
+                <a16:creationId xmlns:a16="http://schemas.microsoft.com/office/drawing/2014/main" id="{D595437C-7A33-49B7-98F0-5D1DB36A0CB1}"/>
+              </a:ext>
+            </a:extLst>
+          </p:cNvPr>
+          <p:cNvSpPr>
+            <a:spLocks noGrp="1"/>
+          </p:cNvSpPr>
+          <p:nvPr>
+            <p:ph type="title"/>
+          </p:nvPr>
+        </p:nvSpPr>
+        <p:spPr/>
+        <p:txBody>
+          <a:bodyPr/>
+          <a:lstStyle/>
+          <a:p>
+            <a:endParaRPr lang="en-US"/>
+          </a:p>
+        </p:txBody>
+      </p:sp>
+      <p:sp>
+        <p:nvSpPr>
+          <p:cNvPr id="3" name="Content Placeholder 2">
+            <a:extLst>
+              <a:ext uri="{FF2B5EF4-FFF2-40B4-BE49-F238E27FC236}">
+                <a16:creationId xmlns:a16="http://schemas.microsoft.com/office/drawing/2014/main" id="{2C417694-56DA-46F1-BE75-7C1987DC6028}"/>
+              </a:ext>
+            </a:extLst>
+          </p:cNvPr>
+          <p:cNvSpPr>
+            <a:spLocks noGrp="1"/>
+          </p:cNvSpPr>
+          <p:nvPr>
+            <p:ph idx="1"/>
+          </p:nvPr>
+        </p:nvSpPr>
+        <p:spPr/>
+        <p:txBody>
+          <a:bodyPr/>
+          <a:lstStyle/>
+          <a:p>
+            <a:endParaRPr lang="en-US"/>
+          </a:p>
+        </p:txBody>
+      </p:sp>
+    </p:spTree>
+    <p:extLst>
+      <p:ext uri="{BB962C8B-B14F-4D97-AF65-F5344CB8AC3E}">
+        <p14:creationId xmlns:p14="http://schemas.microsoft.com/office/powerpoint/2010/main" val="2892559646"/>
       </p:ext>
     </p:extLst>
   </p:cSld>

</xml_diff>